<commit_message>
Adam's comments on code and power point.  See the read-me for comment locations.  In the powerpoint, go to Review -> Show Comments to see my comments.
</commit_message>
<xml_diff>
--- a/Opioid_Crisis.pptx
+++ b/Opioid_Crisis.pptx
@@ -145,6 +145,344 @@
     </p:ext>
   </p:extLst>
 </p:presentation>
+</file>
+
+<file path=ppt/commentAuthors.xml><?xml version="1.0" encoding="utf-8"?>
+<p:cmAuthorLst xmlns:a="http://schemas.openxmlformats.org/drawingml/2006/main" xmlns:r="http://schemas.openxmlformats.org/officeDocument/2006/relationships" xmlns:p="http://schemas.openxmlformats.org/presentationml/2006/main">
+  <p:cmAuthor id="1" name="Adam Luke" initials="AL" lastIdx="34" clrIdx="0">
+    <p:extLst>
+      <p:ext uri="{19B8F6BF-5375-455C-9EA6-DF929625EA0E}">
+        <p15:presenceInfo xmlns:p15="http://schemas.microsoft.com/office/powerpoint/2012/main" userId="S::aluke@branded-group.com::98d12907-3069-44b5-9916-5776d539a564" providerId="AD"/>
+      </p:ext>
+    </p:extLst>
+  </p:cmAuthor>
+</p:cmAuthorLst>
+</file>
+
+<file path=ppt/comments/comment1.xml><?xml version="1.0" encoding="utf-8"?>
+<p:cmLst xmlns:a="http://schemas.openxmlformats.org/drawingml/2006/main" xmlns:r="http://schemas.openxmlformats.org/officeDocument/2006/relationships" xmlns:p="http://schemas.openxmlformats.org/presentationml/2006/main">
+  <p:cm authorId="1" dt="2019-01-15T06:53:03.905" idx="1">
+    <p:pos x="10" y="10"/>
+    <p:text>This is a nice slide summarizing the questions that you want to ask at a high level</p:text>
+    <p:extLst>
+      <p:ext uri="{C676402C-5697-4E1C-873F-D02D1690AC5C}">
+        <p15:threadingInfo xmlns:p15="http://schemas.microsoft.com/office/powerpoint/2012/main" timeZoneBias="480"/>
+      </p:ext>
+    </p:extLst>
+  </p:cm>
+</p:cmLst>
+</file>
+
+<file path=ppt/comments/comment10.xml><?xml version="1.0" encoding="utf-8"?>
+<p:cmLst xmlns:a="http://schemas.openxmlformats.org/drawingml/2006/main" xmlns:r="http://schemas.openxmlformats.org/officeDocument/2006/relationships" xmlns:p="http://schemas.openxmlformats.org/presentationml/2006/main">
+  <p:cm authorId="1" dt="2019-01-15T07:41:39.997" idx="28">
+    <p:pos x="1205" y="1859"/>
+    <p:text>Again, clearly label the x an y axis</p:text>
+    <p:extLst>
+      <p:ext uri="{C676402C-5697-4E1C-873F-D02D1690AC5C}">
+        <p15:threadingInfo xmlns:p15="http://schemas.microsoft.com/office/powerpoint/2012/main" timeZoneBias="480"/>
+      </p:ext>
+    </p:extLst>
+  </p:cm>
+</p:cmLst>
+</file>
+
+<file path=ppt/comments/comment11.xml><?xml version="1.0" encoding="utf-8"?>
+<p:cmLst xmlns:a="http://schemas.openxmlformats.org/drawingml/2006/main" xmlns:r="http://schemas.openxmlformats.org/officeDocument/2006/relationships" xmlns:p="http://schemas.openxmlformats.org/presentationml/2006/main">
+  <p:cm authorId="1" dt="2019-01-15T07:42:10.408" idx="29">
+    <p:pos x="3374" y="1788"/>
+    <p:text>Nice, please report the p values and the means of the different distributions.  I like to see the difference in means to understand how separated the distributions are in addition to the statistical significance of the difference.</p:text>
+    <p:extLst>
+      <p:ext uri="{C676402C-5697-4E1C-873F-D02D1690AC5C}">
+        <p15:threadingInfo xmlns:p15="http://schemas.microsoft.com/office/powerpoint/2012/main" timeZoneBias="480"/>
+      </p:ext>
+    </p:extLst>
+  </p:cm>
+</p:cmLst>
+</file>
+
+<file path=ppt/comments/comment12.xml><?xml version="1.0" encoding="utf-8"?>
+<p:cmLst xmlns:a="http://schemas.openxmlformats.org/drawingml/2006/main" xmlns:r="http://schemas.openxmlformats.org/officeDocument/2006/relationships" xmlns:p="http://schemas.openxmlformats.org/presentationml/2006/main">
+  <p:cm authorId="1" dt="2019-01-15T07:44:16.985" idx="30">
+    <p:pos x="10" y="10"/>
+    <p:text>This is a very nice plot because you can clearly see the difference between the distributions. </p:text>
+    <p:extLst>
+      <p:ext uri="{C676402C-5697-4E1C-873F-D02D1690AC5C}">
+        <p15:threadingInfo xmlns:p15="http://schemas.microsoft.com/office/powerpoint/2012/main" timeZoneBias="480"/>
+      </p:ext>
+    </p:extLst>
+  </p:cm>
+  <p:cm authorId="1" dt="2019-01-15T07:45:31.681" idx="31">
+    <p:pos x="10" y="106"/>
+    <p:text>What is the y axis?  Is this probability density?  Percentage in range?  How did you come up with those smooth curves?</p:text>
+    <p:extLst>
+      <p:ext uri="{C676402C-5697-4E1C-873F-D02D1690AC5C}">
+        <p15:threadingInfo xmlns:p15="http://schemas.microsoft.com/office/powerpoint/2012/main" timeZoneBias="480">
+          <p15:parentCm authorId="1" idx="30"/>
+        </p15:threadingInfo>
+      </p:ext>
+    </p:extLst>
+  </p:cm>
+</p:cmLst>
+</file>
+
+<file path=ppt/comments/comment13.xml><?xml version="1.0" encoding="utf-8"?>
+<p:cmLst xmlns:a="http://schemas.openxmlformats.org/drawingml/2006/main" xmlns:r="http://schemas.openxmlformats.org/officeDocument/2006/relationships" xmlns:p="http://schemas.openxmlformats.org/presentationml/2006/main">
+  <p:cm authorId="1" dt="2019-01-15T07:46:29.600" idx="32">
+    <p:pos x="5656" y="2869"/>
+    <p:text>This is a strong conclusion, nice! </p:text>
+    <p:extLst>
+      <p:ext uri="{C676402C-5697-4E1C-873F-D02D1690AC5C}">
+        <p15:threadingInfo xmlns:p15="http://schemas.microsoft.com/office/powerpoint/2012/main" timeZoneBias="480"/>
+      </p:ext>
+    </p:extLst>
+  </p:cm>
+  <p:cm authorId="1" dt="2019-01-15T07:47:02.456" idx="33">
+    <p:pos x="2172" y="2015"/>
+    <p:text>Did you do any spatial analysis to see if opioids have reached every community?  Did you explore this in your analysis?  If not, best to leave it out of summary</p:text>
+    <p:extLst>
+      <p:ext uri="{C676402C-5697-4E1C-873F-D02D1690AC5C}">
+        <p15:threadingInfo xmlns:p15="http://schemas.microsoft.com/office/powerpoint/2012/main" timeZoneBias="480"/>
+      </p:ext>
+    </p:extLst>
+  </p:cm>
+</p:cmLst>
+</file>
+
+<file path=ppt/comments/comment2.xml><?xml version="1.0" encoding="utf-8"?>
+<p:cmLst xmlns:a="http://schemas.openxmlformats.org/drawingml/2006/main" xmlns:r="http://schemas.openxmlformats.org/officeDocument/2006/relationships" xmlns:p="http://schemas.openxmlformats.org/presentationml/2006/main">
+  <p:cm authorId="1" dt="2019-01-15T06:56:43.825" idx="2">
+    <p:pos x="10" y="10"/>
+    <p:text>Ok, here I would state the hypothesis more precisely:  </p:text>
+    <p:extLst>
+      <p:ext uri="{C676402C-5697-4E1C-873F-D02D1690AC5C}">
+        <p15:threadingInfo xmlns:p15="http://schemas.microsoft.com/office/powerpoint/2012/main" timeZoneBias="480"/>
+      </p:ext>
+    </p:extLst>
+  </p:cm>
+  <p:cm authorId="1" dt="2019-01-15T06:59:07.335" idx="3">
+    <p:pos x="10" y="106"/>
+    <p:text>Hypothesis: Socio-economic status, education level, healthcare, and race are predictors of opioid related death rates.</p:text>
+    <p:extLst>
+      <p:ext uri="{C676402C-5697-4E1C-873F-D02D1690AC5C}">
+        <p15:threadingInfo xmlns:p15="http://schemas.microsoft.com/office/powerpoint/2012/main" timeZoneBias="480">
+          <p15:parentCm authorId="1" idx="2"/>
+        </p15:threadingInfo>
+      </p:ext>
+    </p:extLst>
+  </p:cm>
+  <p:cm authorId="1" dt="2019-01-15T07:00:53.445" idx="4">
+    <p:pos x="10" y="202"/>
+    <p:text>I'm not sure what you mean in the second sentence.  Maybe something like:</p:text>
+    <p:extLst>
+      <p:ext uri="{C676402C-5697-4E1C-873F-D02D1690AC5C}">
+        <p15:threadingInfo xmlns:p15="http://schemas.microsoft.com/office/powerpoint/2012/main" timeZoneBias="480">
+          <p15:parentCm authorId="1" idx="2"/>
+        </p15:threadingInfo>
+      </p:ext>
+    </p:extLst>
+  </p:cm>
+  <p:cm authorId="1" dt="2019-01-15T07:03:44.825" idx="5">
+    <p:pos x="10" y="298"/>
+    <p:text>We hypothesize that education level and access to healthcare are positively correlated with opioid death rates due to the scarcity of prescription drug availability.</p:text>
+    <p:extLst>
+      <p:ext uri="{C676402C-5697-4E1C-873F-D02D1690AC5C}">
+        <p15:threadingInfo xmlns:p15="http://schemas.microsoft.com/office/powerpoint/2012/main" timeZoneBias="480">
+          <p15:parentCm authorId="1" idx="2"/>
+        </p15:threadingInfo>
+      </p:ext>
+    </p:extLst>
+  </p:cm>
+  <p:cm authorId="1" dt="2019-01-15T07:04:46.412" idx="6">
+    <p:pos x="10" y="394"/>
+    <p:text>Generally, avoid words like "believe" in quantitative presentations and state hypothesis specifically so that the goals of the analysis are very clear.</p:text>
+    <p:extLst>
+      <p:ext uri="{C676402C-5697-4E1C-873F-D02D1690AC5C}">
+        <p15:threadingInfo xmlns:p15="http://schemas.microsoft.com/office/powerpoint/2012/main" timeZoneBias="480">
+          <p15:parentCm authorId="1" idx="2"/>
+        </p15:threadingInfo>
+      </p:ext>
+    </p:extLst>
+  </p:cm>
+</p:cmLst>
+</file>
+
+<file path=ppt/comments/comment3.xml><?xml version="1.0" encoding="utf-8"?>
+<p:cmLst xmlns:a="http://schemas.openxmlformats.org/drawingml/2006/main" xmlns:r="http://schemas.openxmlformats.org/officeDocument/2006/relationships" xmlns:p="http://schemas.openxmlformats.org/presentationml/2006/main">
+  <p:cm authorId="1" dt="2019-01-15T07:09:16.147" idx="11">
+    <p:pos x="2470" y="2371"/>
+    <p:text>Regression analysis revealed correlations between opioid death rates and the expected predictors. </p:text>
+    <p:extLst>
+      <p:ext uri="{C676402C-5697-4E1C-873F-D02D1690AC5C}">
+        <p15:threadingInfo xmlns:p15="http://schemas.microsoft.com/office/powerpoint/2012/main" timeZoneBias="480"/>
+      </p:ext>
+    </p:extLst>
+  </p:cm>
+  <p:cm authorId="1" dt="2019-01-15T07:09:52.317" idx="12">
+    <p:pos x="5877" y="2847"/>
+    <p:text>Passing legislation focused on preventing opioid related deaths is positively associated with opioid death rates in that area</p:text>
+    <p:extLst>
+      <p:ext uri="{C676402C-5697-4E1C-873F-D02D1690AC5C}">
+        <p15:threadingInfo xmlns:p15="http://schemas.microsoft.com/office/powerpoint/2012/main" timeZoneBias="480"/>
+      </p:ext>
+    </p:extLst>
+  </p:cm>
+  <p:cm authorId="1" dt="2019-01-15T07:14:15.200" idx="13">
+    <p:pos x="1589" y="3324"/>
+    <p:text>This is ambiguous.  What kind of role?  Which factors?  Are they positively or negatively associated with death rates?  Are the statistically significant?  Etc.</p:text>
+    <p:extLst>
+      <p:ext uri="{C676402C-5697-4E1C-873F-D02D1690AC5C}">
+        <p15:threadingInfo xmlns:p15="http://schemas.microsoft.com/office/powerpoint/2012/main" timeZoneBias="480"/>
+      </p:ext>
+    </p:extLst>
+  </p:cm>
+</p:cmLst>
+</file>
+
+<file path=ppt/comments/comment4.xml><?xml version="1.0" encoding="utf-8"?>
+<p:cmLst xmlns:a="http://schemas.openxmlformats.org/drawingml/2006/main" xmlns:r="http://schemas.openxmlformats.org/officeDocument/2006/relationships" xmlns:p="http://schemas.openxmlformats.org/presentationml/2006/main">
+  <p:cm authorId="1" dt="2019-01-15T07:16:22.795" idx="14">
+    <p:pos x="814" y="1119"/>
+    <p:text/>
+    <p:extLst>
+      <p:ext uri="{C676402C-5697-4E1C-873F-D02D1690AC5C}">
+        <p15:threadingInfo xmlns:p15="http://schemas.microsoft.com/office/powerpoint/2012/main" timeZoneBias="480"/>
+      </p:ext>
+    </p:extLst>
+  </p:cm>
+  <p:cm authorId="1" dt="2019-01-15T07:16:27.588" idx="15">
+    <p:pos x="10" y="10"/>
+    <p:text>Opioid related overdoses per 100,000 population?  Try and be very specific on axis labels </p:text>
+    <p:extLst>
+      <p:ext uri="{C676402C-5697-4E1C-873F-D02D1690AC5C}">
+        <p15:threadingInfo xmlns:p15="http://schemas.microsoft.com/office/powerpoint/2012/main" timeZoneBias="480"/>
+      </p:ext>
+    </p:extLst>
+  </p:cm>
+</p:cmLst>
+</file>
+
+<file path=ppt/comments/comment5.xml><?xml version="1.0" encoding="utf-8"?>
+<p:cmLst xmlns:a="http://schemas.openxmlformats.org/drawingml/2006/main" xmlns:r="http://schemas.openxmlformats.org/officeDocument/2006/relationships" xmlns:p="http://schemas.openxmlformats.org/presentationml/2006/main">
+  <p:cm authorId="1" dt="2019-01-15T07:18:06.610" idx="16">
+    <p:pos x="4767" y="3964"/>
+    <p:text>Nice figure.  Be sure to label the color bar.</p:text>
+    <p:extLst>
+      <p:ext uri="{C676402C-5697-4E1C-873F-D02D1690AC5C}">
+        <p15:threadingInfo xmlns:p15="http://schemas.microsoft.com/office/powerpoint/2012/main" timeZoneBias="480"/>
+      </p:ext>
+    </p:extLst>
+  </p:cm>
+</p:cmLst>
+</file>
+
+<file path=ppt/comments/comment6.xml><?xml version="1.0" encoding="utf-8"?>
+<p:cmLst xmlns:a="http://schemas.openxmlformats.org/drawingml/2006/main" xmlns:r="http://schemas.openxmlformats.org/officeDocument/2006/relationships" xmlns:p="http://schemas.openxmlformats.org/presentationml/2006/main">
+  <p:cm authorId="1" dt="2019-01-15T07:22:34.965" idx="17">
+    <p:pos x="2109" y="1442"/>
+    <p:text>Unclear what the y axis is here</p:text>
+    <p:extLst>
+      <p:ext uri="{C676402C-5697-4E1C-873F-D02D1690AC5C}">
+        <p15:threadingInfo xmlns:p15="http://schemas.microsoft.com/office/powerpoint/2012/main" timeZoneBias="480"/>
+      </p:ext>
+    </p:extLst>
+  </p:cm>
+</p:cmLst>
+</file>
+
+<file path=ppt/comments/comment7.xml><?xml version="1.0" encoding="utf-8"?>
+<p:cmLst xmlns:a="http://schemas.openxmlformats.org/drawingml/2006/main" xmlns:r="http://schemas.openxmlformats.org/officeDocument/2006/relationships" xmlns:p="http://schemas.openxmlformats.org/presentationml/2006/main">
+  <p:cm authorId="1" dt="2019-01-15T07:24:46.984" idx="19">
+    <p:pos x="1418" y="1880"/>
+    <p:text>I don't think this is a complete sentence</p:text>
+    <p:extLst>
+      <p:ext uri="{C676402C-5697-4E1C-873F-D02D1690AC5C}">
+        <p15:threadingInfo xmlns:p15="http://schemas.microsoft.com/office/powerpoint/2012/main" timeZoneBias="480"/>
+      </p:ext>
+    </p:extLst>
+  </p:cm>
+  <p:cm authorId="1" dt="2019-01-15T07:25:15.649" idx="20">
+    <p:pos x="3893" y="2094"/>
+    <p:text>It is appropriate to include the formula you used for "bi-partisan support score" if it is easier to present that then explain it in paragraph form</p:text>
+    <p:extLst>
+      <p:ext uri="{C676402C-5697-4E1C-873F-D02D1690AC5C}">
+        <p15:threadingInfo xmlns:p15="http://schemas.microsoft.com/office/powerpoint/2012/main" timeZoneBias="480"/>
+      </p:ext>
+    </p:extLst>
+  </p:cm>
+</p:cmLst>
+</file>
+
+<file path=ppt/comments/comment8.xml><?xml version="1.0" encoding="utf-8"?>
+<p:cmLst xmlns:a="http://schemas.openxmlformats.org/drawingml/2006/main" xmlns:r="http://schemas.openxmlformats.org/officeDocument/2006/relationships" xmlns:p="http://schemas.openxmlformats.org/presentationml/2006/main">
+  <p:cm authorId="1" dt="2019-01-15T07:26:16.876" idx="21">
+    <p:pos x="1311" y="1638"/>
+    <p:text>Label y axes</p:text>
+    <p:extLst>
+      <p:ext uri="{C676402C-5697-4E1C-873F-D02D1690AC5C}">
+        <p15:threadingInfo xmlns:p15="http://schemas.microsoft.com/office/powerpoint/2012/main" timeZoneBias="480"/>
+      </p:ext>
+    </p:extLst>
+  </p:cm>
+</p:cmLst>
+</file>
+
+<file path=ppt/comments/comment9.xml><?xml version="1.0" encoding="utf-8"?>
+<p:cmLst xmlns:a="http://schemas.openxmlformats.org/drawingml/2006/main" xmlns:r="http://schemas.openxmlformats.org/officeDocument/2006/relationships" xmlns:p="http://schemas.openxmlformats.org/presentationml/2006/main">
+  <p:cm authorId="1" dt="2019-01-15T07:33:31.100" idx="24">
+    <p:pos x="10" y="10"/>
+    <p:text>This is a really interesting plot.  I know that we haven't covered this in class, but you are exploring the linear relationship between one outcome (death rate) and multiple predictors (education and age)</p:text>
+    <p:extLst>
+      <p:ext uri="{C676402C-5697-4E1C-873F-D02D1690AC5C}">
+        <p15:threadingInfo xmlns:p15="http://schemas.microsoft.com/office/powerpoint/2012/main" timeZoneBias="480"/>
+      </p:ext>
+    </p:extLst>
+  </p:cm>
+  <p:cm authorId="1" dt="2019-01-15T07:35:55.147" idx="25">
+    <p:pos x="10" y="106"/>
+    <p:text>In order to test the statistical significance of this regression, the strength of the correlations, etc, you can apply multiple linear regression:</p:text>
+    <p:extLst>
+      <p:ext uri="{C676402C-5697-4E1C-873F-D02D1690AC5C}">
+        <p15:threadingInfo xmlns:p15="http://schemas.microsoft.com/office/powerpoint/2012/main" timeZoneBias="480">
+          <p15:parentCm authorId="1" idx="24"/>
+        </p15:threadingInfo>
+      </p:ext>
+    </p:extLst>
+  </p:cm>
+  <p:cm authorId="1" dt="2019-01-15T07:39:15.845" idx="26">
+    <p:pos x="10" y="202"/>
+    <p:text>http://www.stat.yale.edu/Courses/1997-98/101/linmult.htm</p:text>
+    <p:extLst>
+      <p:ext uri="{C676402C-5697-4E1C-873F-D02D1690AC5C}">
+        <p15:threadingInfo xmlns:p15="http://schemas.microsoft.com/office/powerpoint/2012/main" timeZoneBias="480">
+          <p15:parentCm authorId="1" idx="24"/>
+        </p15:threadingInfo>
+      </p:ext>
+    </p:extLst>
+  </p:cm>
+  <p:cm authorId="1" dt="2019-01-15T07:39:56.825" idx="27">
+    <p:pos x="10" y="298"/>
+    <p:text>If you apply multiple linear regression here, the results can be presented in a much more quantitative way</p:text>
+    <p:extLst>
+      <p:ext uri="{C676402C-5697-4E1C-873F-D02D1690AC5C}">
+        <p15:threadingInfo xmlns:p15="http://schemas.microsoft.com/office/powerpoint/2012/main" timeZoneBias="480">
+          <p15:parentCm authorId="1" idx="24"/>
+        </p15:threadingInfo>
+      </p:ext>
+    </p:extLst>
+  </p:cm>
+  <p:cm authorId="1" dt="2019-01-15T07:49:49.371" idx="34">
+    <p:pos x="10" y="394"/>
+    <p:text>Looking ahead a bit, this comment applies to all of your scatter plots.  It would be really good practice to try this again with multiple linear regression.  It is actually more common to analyze multiple predictors simultaneously in data analytics.</p:text>
+    <p:extLst>
+      <p:ext uri="{C676402C-5697-4E1C-873F-D02D1690AC5C}">
+        <p15:threadingInfo xmlns:p15="http://schemas.microsoft.com/office/powerpoint/2012/main" timeZoneBias="480">
+          <p15:parentCm authorId="1" idx="24"/>
+        </p15:threadingInfo>
+      </p:ext>
+    </p:extLst>
+  </p:cm>
+</p:cmLst>
 </file>
 
 <file path=ppt/diagrams/colors1.xml><?xml version="1.0" encoding="utf-8"?>
@@ -4579,8 +4917,8 @@
     </dgm:pt>
   </dgm:ptLst>
   <dgm:cxnLst>
+    <dgm:cxn modelId="{6BDE7B59-6BE6-46C9-848B-C3A0C3278351}" srcId="{3E97DC75-A5D9-493D-BF7C-DFD7E64139EE}" destId="{0227FEB2-2B95-4408-8C72-3A009CA55C01}" srcOrd="0" destOrd="0" parTransId="{70DDDC35-D198-44E0-B942-1158D9D9B9C6}" sibTransId="{6B684AA3-47A9-4A66-A7F5-F6626040F507}"/>
     <dgm:cxn modelId="{5DFB7A6F-1E80-437E-A4BA-8EE03372A701}" srcId="{3E97DC75-A5D9-493D-BF7C-DFD7E64139EE}" destId="{F4748982-F88A-4A73-AF43-D8A7D0A20FAF}" srcOrd="2" destOrd="0" parTransId="{5EE9A638-D5AB-4EE1-8851-A3CD694AEFE3}" sibTransId="{607B4C5D-F5A2-4117-8ADD-B851F4F27674}"/>
-    <dgm:cxn modelId="{6BDE7B59-6BE6-46C9-848B-C3A0C3278351}" srcId="{3E97DC75-A5D9-493D-BF7C-DFD7E64139EE}" destId="{0227FEB2-2B95-4408-8C72-3A009CA55C01}" srcOrd="0" destOrd="0" parTransId="{70DDDC35-D198-44E0-B942-1158D9D9B9C6}" sibTransId="{6B684AA3-47A9-4A66-A7F5-F6626040F507}"/>
     <dgm:cxn modelId="{B0072393-66F7-4AA0-86B6-B86185EF55BE}" type="presOf" srcId="{281B0C7B-A098-4BB5-852F-E7C0829BCD48}" destId="{F7158216-9AC4-4B93-8FD6-48E03E34674A}" srcOrd="0" destOrd="0" presId="urn:microsoft.com/office/officeart/2018/2/layout/IconVerticalSolidList"/>
     <dgm:cxn modelId="{F4CA3E9C-E22D-4044-9F44-C0D0CE48184D}" type="presOf" srcId="{0227FEB2-2B95-4408-8C72-3A009CA55C01}" destId="{1AEFDDBF-6775-479D-A00B-362529B77FCE}" srcOrd="0" destOrd="0" presId="urn:microsoft.com/office/officeart/2018/2/layout/IconVerticalSolidList"/>
     <dgm:cxn modelId="{016198C9-9AA4-44FD-808D-15A9DB127337}" type="presOf" srcId="{3E97DC75-A5D9-493D-BF7C-DFD7E64139EE}" destId="{9447BAA8-4A61-4563-92E0-622AB7B39081}" srcOrd="0" destOrd="0" presId="urn:microsoft.com/office/officeart/2018/2/layout/IconVerticalSolidList"/>
@@ -11802,7 +12140,7 @@
           <a:p>
             <a:fld id="{022EB929-C8E7-4C69-B2B3-E06BE6FBF3CD}" type="datetimeFigureOut">
               <a:rPr lang="en-US" smtClean="0"/>
-              <a:t>12/20/2018</a:t>
+              <a:t>1/15/19</a:t>
             </a:fld>
             <a:endParaRPr lang="en-US"/>
           </a:p>
@@ -14116,7 +14454,7 @@
           <a:p>
             <a:fld id="{3F974312-6224-4E05-BC8F-FA4F74461FF7}" type="datetimeFigureOut">
               <a:rPr lang="en-US" smtClean="0"/>
-              <a:t>12/18/2018</a:t>
+              <a:t>1/15/19</a:t>
             </a:fld>
             <a:endParaRPr lang="en-US"/>
           </a:p>
@@ -14391,7 +14729,7 @@
           <a:p>
             <a:fld id="{3F974312-6224-4E05-BC8F-FA4F74461FF7}" type="datetimeFigureOut">
               <a:rPr lang="en-US" smtClean="0"/>
-              <a:t>12/18/2018</a:t>
+              <a:t>1/15/19</a:t>
             </a:fld>
             <a:endParaRPr lang="en-US"/>
           </a:p>
@@ -14585,7 +14923,7 @@
           <a:p>
             <a:fld id="{3F974312-6224-4E05-BC8F-FA4F74461FF7}" type="datetimeFigureOut">
               <a:rPr lang="en-US" smtClean="0"/>
-              <a:t>12/18/2018</a:t>
+              <a:t>1/15/19</a:t>
             </a:fld>
             <a:endParaRPr lang="en-US"/>
           </a:p>
@@ -14858,7 +15196,7 @@
           <a:p>
             <a:fld id="{3F974312-6224-4E05-BC8F-FA4F74461FF7}" type="datetimeFigureOut">
               <a:rPr lang="en-US" smtClean="0"/>
-              <a:t>12/18/2018</a:t>
+              <a:t>1/15/19</a:t>
             </a:fld>
             <a:endParaRPr lang="en-US"/>
           </a:p>
@@ -15199,7 +15537,7 @@
           <a:p>
             <a:fld id="{3F974312-6224-4E05-BC8F-FA4F74461FF7}" type="datetimeFigureOut">
               <a:rPr lang="en-US" smtClean="0"/>
-              <a:t>12/18/2018</a:t>
+              <a:t>1/15/19</a:t>
             </a:fld>
             <a:endParaRPr lang="en-US"/>
           </a:p>
@@ -15822,7 +16160,7 @@
           <a:p>
             <a:fld id="{3F974312-6224-4E05-BC8F-FA4F74461FF7}" type="datetimeFigureOut">
               <a:rPr lang="en-US" smtClean="0"/>
-              <a:t>12/18/2018</a:t>
+              <a:t>1/15/19</a:t>
             </a:fld>
             <a:endParaRPr lang="en-US"/>
           </a:p>
@@ -16682,7 +17020,7 @@
           <a:p>
             <a:fld id="{3F974312-6224-4E05-BC8F-FA4F74461FF7}" type="datetimeFigureOut">
               <a:rPr lang="en-US" smtClean="0"/>
-              <a:t>12/18/2018</a:t>
+              <a:t>1/15/19</a:t>
             </a:fld>
             <a:endParaRPr lang="en-US"/>
           </a:p>
@@ -16852,7 +17190,7 @@
           <a:p>
             <a:fld id="{3F974312-6224-4E05-BC8F-FA4F74461FF7}" type="datetimeFigureOut">
               <a:rPr lang="en-US" smtClean="0"/>
-              <a:t>12/18/2018</a:t>
+              <a:t>1/15/19</a:t>
             </a:fld>
             <a:endParaRPr lang="en-US"/>
           </a:p>
@@ -17032,7 +17370,7 @@
           <a:p>
             <a:fld id="{3F974312-6224-4E05-BC8F-FA4F74461FF7}" type="datetimeFigureOut">
               <a:rPr lang="en-US" smtClean="0"/>
-              <a:t>12/18/2018</a:t>
+              <a:t>1/15/19</a:t>
             </a:fld>
             <a:endParaRPr lang="en-US"/>
           </a:p>
@@ -17202,7 +17540,7 @@
           <a:p>
             <a:fld id="{3F974312-6224-4E05-BC8F-FA4F74461FF7}" type="datetimeFigureOut">
               <a:rPr lang="en-US" smtClean="0"/>
-              <a:t>12/18/2018</a:t>
+              <a:t>1/15/19</a:t>
             </a:fld>
             <a:endParaRPr lang="en-US"/>
           </a:p>
@@ -17449,7 +17787,7 @@
           <a:p>
             <a:fld id="{3F974312-6224-4E05-BC8F-FA4F74461FF7}" type="datetimeFigureOut">
               <a:rPr lang="en-US" smtClean="0"/>
-              <a:t>12/18/2018</a:t>
+              <a:t>1/15/19</a:t>
             </a:fld>
             <a:endParaRPr lang="en-US"/>
           </a:p>
@@ -17741,7 +18079,7 @@
           <a:p>
             <a:fld id="{3F974312-6224-4E05-BC8F-FA4F74461FF7}" type="datetimeFigureOut">
               <a:rPr lang="en-US" smtClean="0"/>
-              <a:t>12/18/2018</a:t>
+              <a:t>1/15/19</a:t>
             </a:fld>
             <a:endParaRPr lang="en-US"/>
           </a:p>
@@ -18185,7 +18523,7 @@
           <a:p>
             <a:fld id="{3F974312-6224-4E05-BC8F-FA4F74461FF7}" type="datetimeFigureOut">
               <a:rPr lang="en-US" smtClean="0"/>
-              <a:t>12/18/2018</a:t>
+              <a:t>1/15/19</a:t>
             </a:fld>
             <a:endParaRPr lang="en-US"/>
           </a:p>
@@ -18303,7 +18641,7 @@
           <a:p>
             <a:fld id="{3F974312-6224-4E05-BC8F-FA4F74461FF7}" type="datetimeFigureOut">
               <a:rPr lang="en-US" smtClean="0"/>
-              <a:t>12/18/2018</a:t>
+              <a:t>1/15/19</a:t>
             </a:fld>
             <a:endParaRPr lang="en-US"/>
           </a:p>
@@ -18398,7 +18736,7 @@
           <a:p>
             <a:fld id="{3F974312-6224-4E05-BC8F-FA4F74461FF7}" type="datetimeFigureOut">
               <a:rPr lang="en-US" smtClean="0"/>
-              <a:t>12/18/2018</a:t>
+              <a:t>1/15/19</a:t>
             </a:fld>
             <a:endParaRPr lang="en-US"/>
           </a:p>
@@ -18677,7 +19015,7 @@
           <a:p>
             <a:fld id="{3F974312-6224-4E05-BC8F-FA4F74461FF7}" type="datetimeFigureOut">
               <a:rPr lang="en-US" smtClean="0"/>
-              <a:t>12/18/2018</a:t>
+              <a:t>1/15/19</a:t>
             </a:fld>
             <a:endParaRPr lang="en-US"/>
           </a:p>
@@ -18952,7 +19290,7 @@
           <a:p>
             <a:fld id="{3F974312-6224-4E05-BC8F-FA4F74461FF7}" type="datetimeFigureOut">
               <a:rPr lang="en-US" smtClean="0"/>
-              <a:t>12/18/2018</a:t>
+              <a:t>1/15/19</a:t>
             </a:fld>
             <a:endParaRPr lang="en-US"/>
           </a:p>
@@ -19381,7 +19719,7 @@
           <a:p>
             <a:fld id="{3F974312-6224-4E05-BC8F-FA4F74461FF7}" type="datetimeFigureOut">
               <a:rPr lang="en-US" smtClean="0"/>
-              <a:t>12/18/2018</a:t>
+              <a:t>1/15/19</a:t>
             </a:fld>
             <a:endParaRPr lang="en-US"/>
           </a:p>
@@ -21584,7 +21922,7 @@
         </p:blipFill>
         <p:spPr>
           <a:xfrm>
-            <a:off x="3310467" y="643467"/>
+            <a:off x="3230039" y="833171"/>
             <a:ext cx="5571066" cy="5571066"/>
           </a:xfrm>
           <a:prstGeom prst="rect">

</xml_diff>